<commit_message>
update 1 object: player_test_2.png
</commit_message>
<xml_diff>
--- a/внешний вид.pptx
+++ b/внешний вид.pptx
@@ -7,6 +7,7 @@
   <p:sldIdLst>
     <p:sldId id="256" r:id="rId2"/>
     <p:sldId id="257" r:id="rId3"/>
+    <p:sldId id="258" r:id="rId4"/>
   </p:sldIdLst>
   <p:sldSz cx="6697663" cy="3779838"/>
   <p:notesSz cx="6858000" cy="9144000"/>
@@ -290,7 +291,7 @@
             <a:fld id="{A9D630E6-080C-48C4-8F9A-1A9E1A83D52B}" type="datetimeFigureOut">
               <a:rPr lang="ru-RU" smtClean="0"/>
               <a:pPr/>
-              <a:t>17.12.2023</a:t>
+              <a:t>29.12.2023</a:t>
             </a:fld>
             <a:endParaRPr lang="ru-RU"/>
           </a:p>
@@ -457,7 +458,7 @@
             <a:fld id="{A9D630E6-080C-48C4-8F9A-1A9E1A83D52B}" type="datetimeFigureOut">
               <a:rPr lang="ru-RU" smtClean="0"/>
               <a:pPr/>
-              <a:t>17.12.2023</a:t>
+              <a:t>29.12.2023</a:t>
             </a:fld>
             <a:endParaRPr lang="ru-RU"/>
           </a:p>
@@ -634,7 +635,7 @@
             <a:fld id="{A9D630E6-080C-48C4-8F9A-1A9E1A83D52B}" type="datetimeFigureOut">
               <a:rPr lang="ru-RU" smtClean="0"/>
               <a:pPr/>
-              <a:t>17.12.2023</a:t>
+              <a:t>29.12.2023</a:t>
             </a:fld>
             <a:endParaRPr lang="ru-RU"/>
           </a:p>
@@ -801,7 +802,7 @@
             <a:fld id="{A9D630E6-080C-48C4-8F9A-1A9E1A83D52B}" type="datetimeFigureOut">
               <a:rPr lang="ru-RU" smtClean="0"/>
               <a:pPr/>
-              <a:t>17.12.2023</a:t>
+              <a:t>29.12.2023</a:t>
             </a:fld>
             <a:endParaRPr lang="ru-RU"/>
           </a:p>
@@ -1044,7 +1045,7 @@
             <a:fld id="{A9D630E6-080C-48C4-8F9A-1A9E1A83D52B}" type="datetimeFigureOut">
               <a:rPr lang="ru-RU" smtClean="0"/>
               <a:pPr/>
-              <a:t>17.12.2023</a:t>
+              <a:t>29.12.2023</a:t>
             </a:fld>
             <a:endParaRPr lang="ru-RU"/>
           </a:p>
@@ -1329,7 +1330,7 @@
             <a:fld id="{A9D630E6-080C-48C4-8F9A-1A9E1A83D52B}" type="datetimeFigureOut">
               <a:rPr lang="ru-RU" smtClean="0"/>
               <a:pPr/>
-              <a:t>17.12.2023</a:t>
+              <a:t>29.12.2023</a:t>
             </a:fld>
             <a:endParaRPr lang="ru-RU"/>
           </a:p>
@@ -1748,7 +1749,7 @@
             <a:fld id="{A9D630E6-080C-48C4-8F9A-1A9E1A83D52B}" type="datetimeFigureOut">
               <a:rPr lang="ru-RU" smtClean="0"/>
               <a:pPr/>
-              <a:t>17.12.2023</a:t>
+              <a:t>29.12.2023</a:t>
             </a:fld>
             <a:endParaRPr lang="ru-RU"/>
           </a:p>
@@ -1863,7 +1864,7 @@
             <a:fld id="{A9D630E6-080C-48C4-8F9A-1A9E1A83D52B}" type="datetimeFigureOut">
               <a:rPr lang="ru-RU" smtClean="0"/>
               <a:pPr/>
-              <a:t>17.12.2023</a:t>
+              <a:t>29.12.2023</a:t>
             </a:fld>
             <a:endParaRPr lang="ru-RU"/>
           </a:p>
@@ -1955,7 +1956,7 @@
             <a:fld id="{A9D630E6-080C-48C4-8F9A-1A9E1A83D52B}" type="datetimeFigureOut">
               <a:rPr lang="ru-RU" smtClean="0"/>
               <a:pPr/>
-              <a:t>17.12.2023</a:t>
+              <a:t>29.12.2023</a:t>
             </a:fld>
             <a:endParaRPr lang="ru-RU"/>
           </a:p>
@@ -2229,7 +2230,7 @@
             <a:fld id="{A9D630E6-080C-48C4-8F9A-1A9E1A83D52B}" type="datetimeFigureOut">
               <a:rPr lang="ru-RU" smtClean="0"/>
               <a:pPr/>
-              <a:t>17.12.2023</a:t>
+              <a:t>29.12.2023</a:t>
             </a:fld>
             <a:endParaRPr lang="ru-RU"/>
           </a:p>
@@ -2479,7 +2480,7 @@
             <a:fld id="{A9D630E6-080C-48C4-8F9A-1A9E1A83D52B}" type="datetimeFigureOut">
               <a:rPr lang="ru-RU" smtClean="0"/>
               <a:pPr/>
-              <a:t>17.12.2023</a:t>
+              <a:t>29.12.2023</a:t>
             </a:fld>
             <a:endParaRPr lang="ru-RU"/>
           </a:p>
@@ -2689,7 +2690,7 @@
             <a:fld id="{A9D630E6-080C-48C4-8F9A-1A9E1A83D52B}" type="datetimeFigureOut">
               <a:rPr lang="ru-RU" smtClean="0"/>
               <a:pPr/>
-              <a:t>17.12.2023</a:t>
+              <a:t>29.12.2023</a:t>
             </a:fld>
             <a:endParaRPr lang="ru-RU"/>
           </a:p>
@@ -3298,7 +3299,30 @@
               </a:r>
               <a:r>
                 <a:rPr lang="ru-RU" sz="800" dirty="0" smtClean="0"/>
-                <a:t> с видом сбоку</a:t>
+                <a:t> с видом </a:t>
+              </a:r>
+              <a:r>
+                <a:rPr lang="ru-RU" sz="800" dirty="0" smtClean="0"/>
+                <a:t>сбоку</a:t>
+              </a:r>
+              <a:endParaRPr lang="en-US" sz="800" dirty="0" smtClean="0"/>
+            </a:p>
+            <a:p>
+              <a:pPr algn="ctr"/>
+              <a:r>
+                <a:rPr lang="ru-RU" sz="800" dirty="0" smtClean="0"/>
+                <a:t>ИЗМЕННЕННО</a:t>
+              </a:r>
+              <a:r>
+                <a:rPr lang="ru-RU" sz="800" dirty="0" smtClean="0"/>
+                <a:t>:</a:t>
+              </a:r>
+            </a:p>
+            <a:p>
+              <a:pPr algn="ctr"/>
+              <a:r>
+                <a:rPr lang="ru-RU" sz="800" dirty="0" smtClean="0"/>
+                <a:t>Смотреть пункт №1</a:t>
               </a:r>
               <a:endParaRPr lang="ru-RU" sz="800" dirty="0"/>
             </a:p>
@@ -9902,6 +9926,105 @@
 </p:sld>
 </file>
 
+<file path=ppt/slides/slide3.xml><?xml version="1.0" encoding="utf-8"?>
+<p:sld xmlns:a="http://schemas.openxmlformats.org/drawingml/2006/main" xmlns:r="http://schemas.openxmlformats.org/officeDocument/2006/relationships" xmlns:p="http://schemas.openxmlformats.org/presentationml/2006/main">
+  <p:cSld>
+    <p:spTree>
+      <p:nvGrpSpPr>
+        <p:cNvPr id="1" name=""/>
+        <p:cNvGrpSpPr/>
+        <p:nvPr/>
+      </p:nvGrpSpPr>
+      <p:grpSpPr>
+        <a:xfrm>
+          <a:off x="0" y="0"/>
+          <a:ext cx="0" cy="0"/>
+          <a:chOff x="0" y="0"/>
+          <a:chExt cx="0" cy="0"/>
+        </a:xfrm>
+      </p:grpSpPr>
+      <p:sp>
+        <p:nvSpPr>
+          <p:cNvPr id="3" name="Содержимое 2"/>
+          <p:cNvSpPr>
+            <a:spLocks noGrp="1"/>
+          </p:cNvSpPr>
+          <p:nvPr>
+            <p:ph idx="1"/>
+          </p:nvPr>
+        </p:nvSpPr>
+        <p:spPr>
+          <a:xfrm>
+            <a:off x="-1" y="0"/>
+            <a:ext cx="6697663" cy="3779838"/>
+          </a:xfrm>
+        </p:spPr>
+        <p:txBody>
+          <a:bodyPr/>
+          <a:lstStyle/>
+          <a:p>
+            <a:pPr>
+              <a:buNone/>
+            </a:pPr>
+            <a:r>
+              <a:rPr lang="ru-RU" dirty="0" smtClean="0"/>
+              <a:t>Пункт№1:</a:t>
+            </a:r>
+          </a:p>
+          <a:p>
+            <a:r>
+              <a:rPr lang="ru-RU" dirty="0" smtClean="0"/>
+              <a:t>Локация сбоку будет показываться ТАМ ГДЕ и сверху то есть например если </a:t>
+            </a:r>
+            <a:r>
+              <a:rPr lang="ru-RU" dirty="0" err="1" smtClean="0"/>
+              <a:t>гг</a:t>
+            </a:r>
+            <a:r>
+              <a:rPr lang="ru-RU" dirty="0" smtClean="0"/>
+              <a:t> заходит в спец локацию то вид изменятся на боковой ТАМ ЖЕ ГДЕ был вид сверху.   </a:t>
+            </a:r>
+            <a:r>
+              <a:rPr lang="en-US" dirty="0" smtClean="0"/>
+              <a:t>P.S.</a:t>
+            </a:r>
+            <a:r>
+              <a:rPr lang="ru-RU" dirty="0" smtClean="0"/>
+              <a:t>: там где красное</a:t>
+            </a:r>
+          </a:p>
+          <a:p>
+            <a:r>
+              <a:rPr lang="ru-RU" dirty="0" smtClean="0"/>
+              <a:t>На месте </a:t>
+            </a:r>
+            <a:r>
+              <a:rPr lang="ru-RU" dirty="0" err="1" smtClean="0"/>
+              <a:t>фиолет</a:t>
+            </a:r>
+            <a:r>
+              <a:rPr lang="ru-RU" dirty="0" smtClean="0"/>
+              <a:t>. Будут показываться достижения или </a:t>
+            </a:r>
+            <a:r>
+              <a:rPr lang="ru-RU" dirty="0" err="1" smtClean="0"/>
+              <a:t>комбо</a:t>
+            </a:r>
+            <a:r>
+              <a:rPr lang="ru-RU" dirty="0" smtClean="0"/>
+              <a:t>.</a:t>
+            </a:r>
+          </a:p>
+        </p:txBody>
+      </p:sp>
+    </p:spTree>
+  </p:cSld>
+  <p:clrMapOvr>
+    <a:masterClrMapping/>
+  </p:clrMapOvr>
+</p:sld>
+</file>
+
 <file path=ppt/theme/theme1.xml><?xml version="1.0" encoding="utf-8"?>
 <a:theme xmlns:a="http://schemas.openxmlformats.org/drawingml/2006/main" name="Тема Office">
   <a:themeElements>

</xml_diff>